<commit_message>
Final Project Proposal (updated diagrams)
</commit_message>
<xml_diff>
--- a/Project_01/ENGI301_Project_Proposal.pptx
+++ b/Project_01/ENGI301_Project_Proposal.pptx
@@ -272,7 +272,7 @@
           <a:p>
             <a:fld id="{59041DB8-B66F-4DC8-A96E-33677E0F90FF}" type="datetimeFigureOut">
               <a:rPr lang="en-US" smtClean="0"/>
-              <a:t>10/24/2019</a:t>
+              <a:t>11/18/2019</a:t>
             </a:fld>
             <a:endParaRPr lang="en-US"/>
           </a:p>
@@ -437,7 +437,7 @@
           <a:p>
             <a:fld id="{DEB49C4A-65AC-492D-9701-81B46C3AD0E4}" type="datetimeFigureOut">
               <a:rPr lang="en-US" smtClean="0"/>
-              <a:t>10/24/2019</a:t>
+              <a:t>11/18/2019</a:t>
             </a:fld>
             <a:endParaRPr lang="en-US"/>
           </a:p>
@@ -2845,7 +2845,7 @@
           <a:p>
             <a:fld id="{384A29A4-78C8-47AB-BA06-22CB45938951}" type="datetime1">
               <a:rPr lang="en-US" smtClean="0"/>
-              <a:t>10/24/2019</a:t>
+              <a:t>11/18/2019</a:t>
             </a:fld>
             <a:endParaRPr lang="en-US"/>
           </a:p>
@@ -3040,7 +3040,7 @@
           <a:p>
             <a:fld id="{E1ED4ACF-2D82-46F2-A8E9-23963AA34E86}" type="datetime1">
               <a:rPr lang="en-US" smtClean="0"/>
-              <a:t>10/24/2019</a:t>
+              <a:t>11/18/2019</a:t>
             </a:fld>
             <a:endParaRPr lang="en-US"/>
           </a:p>
@@ -3234,7 +3234,7 @@
           <a:p>
             <a:fld id="{AE374B5B-21A0-4192-BF4C-38187F1A68D8}" type="datetime1">
               <a:rPr lang="en-US" smtClean="0"/>
-              <a:t>10/24/2019</a:t>
+              <a:t>11/18/2019</a:t>
             </a:fld>
             <a:endParaRPr lang="en-US"/>
           </a:p>
@@ -5575,7 +5575,7 @@
           <a:p>
             <a:fld id="{33B5CF7C-B333-48E1-A4A6-83A3C8B73AC0}" type="datetime1">
               <a:rPr lang="en-US" smtClean="0"/>
-              <a:t>10/24/2019</a:t>
+              <a:t>11/18/2019</a:t>
             </a:fld>
             <a:endParaRPr lang="en-US"/>
           </a:p>
@@ -6028,7 +6028,7 @@
           <a:p>
             <a:fld id="{AE320762-5CBF-4210-AB54-376B091119F8}" type="datetime1">
               <a:rPr lang="en-US" smtClean="0"/>
-              <a:t>10/24/2019</a:t>
+              <a:t>11/18/2019</a:t>
             </a:fld>
             <a:endParaRPr lang="en-US"/>
           </a:p>
@@ -6160,7 +6160,7 @@
           <a:p>
             <a:fld id="{7F0DB371-BF5F-4058-A212-1A908E4D2674}" type="datetime1">
               <a:rPr lang="en-US" smtClean="0"/>
-              <a:t>10/24/2019</a:t>
+              <a:t>11/18/2019</a:t>
             </a:fld>
             <a:endParaRPr lang="en-US"/>
           </a:p>
@@ -8093,7 +8093,7 @@
           <a:p>
             <a:fld id="{60A4083B-90AA-48CF-BAD5-00AA24D7F288}" type="datetime1">
               <a:rPr lang="en-US" smtClean="0"/>
-              <a:t>10/24/2019</a:t>
+              <a:t>11/18/2019</a:t>
             </a:fld>
             <a:endParaRPr lang="en-US"/>
           </a:p>
@@ -10352,7 +10352,7 @@
             <a:fld id="{F5BAF629-ECA2-4CF3-B790-9D9BDED98269}" type="datetime1">
               <a:rPr lang="en-US" smtClean="0"/>
               <a:pPr/>
-              <a:t>10/24/2019</a:t>
+              <a:t>11/18/2019</a:t>
             </a:fld>
             <a:endParaRPr lang="en-US"/>
           </a:p>
@@ -14647,7 +14647,7 @@
             <a:fld id="{B51B2453-8663-4C69-AF73-9FD7B1DEC5D0}" type="datetime1">
               <a:rPr lang="en-US" smtClean="0"/>
               <a:pPr/>
-              <a:t>10/24/2019</a:t>
+              <a:t>11/18/2019</a:t>
             </a:fld>
             <a:endParaRPr lang="en-US" dirty="0"/>
           </a:p>
@@ -16673,7 +16673,7 @@
             <a:p>
               <a:r>
                 <a:rPr lang="en-US" dirty="0"/>
-                <a:t>SPI</a:t>
+                <a:t>SPI0</a:t>
               </a:r>
             </a:p>
           </p:txBody>
@@ -16719,193 +16719,6 @@
           </a:fontRef>
         </p:style>
       </p:cxnSp>
-      <p:grpSp>
-        <p:nvGrpSpPr>
-          <p:cNvPr id="38" name="Group 37">
-            <a:extLst>
-              <a:ext uri="{FF2B5EF4-FFF2-40B4-BE49-F238E27FC236}">
-                <a16:creationId xmlns:a16="http://schemas.microsoft.com/office/drawing/2014/main" id="{59F4F9F7-34CC-4B1B-B419-2AB20B609B76}"/>
-              </a:ext>
-            </a:extLst>
-          </p:cNvPr>
-          <p:cNvGrpSpPr/>
-          <p:nvPr/>
-        </p:nvGrpSpPr>
-        <p:grpSpPr>
-          <a:xfrm>
-            <a:off x="2550693" y="3760232"/>
-            <a:ext cx="1752600" cy="1562100"/>
-            <a:chOff x="6536157" y="2578768"/>
-            <a:chExt cx="1752600" cy="1562100"/>
-          </a:xfrm>
-          <a:solidFill>
-            <a:schemeClr val="bg1">
-              <a:lumMod val="65000"/>
-            </a:schemeClr>
-          </a:solidFill>
-        </p:grpSpPr>
-        <p:sp>
-          <p:nvSpPr>
-            <p:cNvPr id="39" name="Rectangle 38">
-              <a:extLst>
-                <a:ext uri="{FF2B5EF4-FFF2-40B4-BE49-F238E27FC236}">
-                  <a16:creationId xmlns:a16="http://schemas.microsoft.com/office/drawing/2014/main" id="{BC39DC12-B093-4B78-A001-141864EBAA07}"/>
-                </a:ext>
-              </a:extLst>
-            </p:cNvPr>
-            <p:cNvSpPr/>
-            <p:nvPr/>
-          </p:nvSpPr>
-          <p:spPr>
-            <a:xfrm>
-              <a:off x="6536157" y="2578768"/>
-              <a:ext cx="1752600" cy="1562100"/>
-            </a:xfrm>
-            <a:prstGeom prst="rect">
-              <a:avLst/>
-            </a:prstGeom>
-            <a:grpFill/>
-          </p:spPr>
-          <p:style>
-            <a:lnRef idx="2">
-              <a:schemeClr val="accent1">
-                <a:shade val="50000"/>
-              </a:schemeClr>
-            </a:lnRef>
-            <a:fillRef idx="1">
-              <a:schemeClr val="accent1"/>
-            </a:fillRef>
-            <a:effectRef idx="0">
-              <a:schemeClr val="accent1"/>
-            </a:effectRef>
-            <a:fontRef idx="minor">
-              <a:schemeClr val="lt1"/>
-            </a:fontRef>
-          </p:style>
-          <p:txBody>
-            <a:bodyPr rtlCol="0" anchor="ctr"/>
-            <a:lstStyle/>
-            <a:p>
-              <a:pPr algn="ctr"/>
-              <a:endParaRPr lang="en-US"/>
-            </a:p>
-          </p:txBody>
-        </p:sp>
-        <p:sp>
-          <p:nvSpPr>
-            <p:cNvPr id="40" name="TextBox 39">
-              <a:extLst>
-                <a:ext uri="{FF2B5EF4-FFF2-40B4-BE49-F238E27FC236}">
-                  <a16:creationId xmlns:a16="http://schemas.microsoft.com/office/drawing/2014/main" id="{B7622D85-A03B-4D6D-95E2-834503D5E07A}"/>
-                </a:ext>
-              </a:extLst>
-            </p:cNvPr>
-            <p:cNvSpPr txBox="1"/>
-            <p:nvPr/>
-          </p:nvSpPr>
-          <p:spPr>
-            <a:xfrm>
-              <a:off x="6840957" y="2967981"/>
-              <a:ext cx="1143000" cy="646331"/>
-            </a:xfrm>
-            <a:prstGeom prst="rect">
-              <a:avLst/>
-            </a:prstGeom>
-            <a:grpFill/>
-          </p:spPr>
-          <p:txBody>
-            <a:bodyPr wrap="square" rtlCol="0">
-              <a:spAutoFit/>
-            </a:bodyPr>
-            <a:lstStyle/>
-            <a:p>
-              <a:pPr algn="ctr"/>
-              <a:r>
-                <a:rPr lang="en-US" dirty="0"/>
-                <a:t>Power Bank</a:t>
-              </a:r>
-            </a:p>
-          </p:txBody>
-        </p:sp>
-      </p:grpSp>
-      <p:cxnSp>
-        <p:nvCxnSpPr>
-          <p:cNvPr id="45" name="Straight Connector 44">
-            <a:extLst>
-              <a:ext uri="{FF2B5EF4-FFF2-40B4-BE49-F238E27FC236}">
-                <a16:creationId xmlns:a16="http://schemas.microsoft.com/office/drawing/2014/main" id="{9C6E18EF-80F9-4F43-BF54-3CE515B17EF0}"/>
-              </a:ext>
-            </a:extLst>
-          </p:cNvPr>
-          <p:cNvCxnSpPr>
-            <a:stCxn id="39" idx="3"/>
-          </p:cNvCxnSpPr>
-          <p:nvPr/>
-        </p:nvCxnSpPr>
-        <p:spPr>
-          <a:xfrm>
-            <a:off x="4303293" y="4541282"/>
-            <a:ext cx="935457" cy="0"/>
-          </a:xfrm>
-          <a:prstGeom prst="line">
-            <a:avLst/>
-          </a:prstGeom>
-          <a:ln w="28575">
-            <a:solidFill>
-              <a:srgbClr val="FF0000"/>
-            </a:solidFill>
-          </a:ln>
-        </p:spPr>
-        <p:style>
-          <a:lnRef idx="1">
-            <a:schemeClr val="dk1"/>
-          </a:lnRef>
-          <a:fillRef idx="0">
-            <a:schemeClr val="dk1"/>
-          </a:fillRef>
-          <a:effectRef idx="0">
-            <a:schemeClr val="dk1"/>
-          </a:effectRef>
-          <a:fontRef idx="minor">
-            <a:schemeClr val="tx1"/>
-          </a:fontRef>
-        </p:style>
-      </p:cxnSp>
-      <p:sp>
-        <p:nvSpPr>
-          <p:cNvPr id="47" name="TextBox 46">
-            <a:extLst>
-              <a:ext uri="{FF2B5EF4-FFF2-40B4-BE49-F238E27FC236}">
-                <a16:creationId xmlns:a16="http://schemas.microsoft.com/office/drawing/2014/main" id="{53624500-FC48-4CBA-B354-9FE51C5A79C4}"/>
-              </a:ext>
-            </a:extLst>
-          </p:cNvPr>
-          <p:cNvSpPr txBox="1"/>
-          <p:nvPr/>
-        </p:nvSpPr>
-        <p:spPr>
-          <a:xfrm>
-            <a:off x="4457700" y="4187973"/>
-            <a:ext cx="715877" cy="369332"/>
-          </a:xfrm>
-          <a:prstGeom prst="rect">
-            <a:avLst/>
-          </a:prstGeom>
-          <a:noFill/>
-        </p:spPr>
-        <p:txBody>
-          <a:bodyPr wrap="square" rtlCol="0">
-            <a:spAutoFit/>
-          </a:bodyPr>
-          <a:lstStyle/>
-          <a:p>
-            <a:r>
-              <a:rPr lang="en-US" dirty="0"/>
-              <a:t>4.8A</a:t>
-            </a:r>
-          </a:p>
-        </p:txBody>
-      </p:sp>
       <p:sp>
         <p:nvSpPr>
           <p:cNvPr id="26" name="Rectangle 25">
@@ -16921,57 +16734,6 @@
         <p:spPr>
           <a:xfrm>
             <a:off x="8777036" y="2035068"/>
-            <a:ext cx="862265" cy="647700"/>
-          </a:xfrm>
-          <a:prstGeom prst="rect">
-            <a:avLst/>
-          </a:prstGeom>
-          <a:solidFill>
-            <a:schemeClr val="bg1">
-              <a:lumMod val="65000"/>
-            </a:schemeClr>
-          </a:solidFill>
-        </p:spPr>
-        <p:style>
-          <a:lnRef idx="2">
-            <a:schemeClr val="accent1">
-              <a:shade val="50000"/>
-            </a:schemeClr>
-          </a:lnRef>
-          <a:fillRef idx="1">
-            <a:schemeClr val="accent1"/>
-          </a:fillRef>
-          <a:effectRef idx="0">
-            <a:schemeClr val="accent1"/>
-          </a:effectRef>
-          <a:fontRef idx="minor">
-            <a:schemeClr val="lt1"/>
-          </a:fontRef>
-        </p:style>
-        <p:txBody>
-          <a:bodyPr rtlCol="0" anchor="ctr"/>
-          <a:lstStyle/>
-          <a:p>
-            <a:pPr algn="ctr"/>
-            <a:endParaRPr lang="en-US"/>
-          </a:p>
-        </p:txBody>
-      </p:sp>
-      <p:sp>
-        <p:nvSpPr>
-          <p:cNvPr id="27" name="Rectangle 26">
-            <a:extLst>
-              <a:ext uri="{FF2B5EF4-FFF2-40B4-BE49-F238E27FC236}">
-                <a16:creationId xmlns:a16="http://schemas.microsoft.com/office/drawing/2014/main" id="{C7002DAC-BFC3-47DB-880A-21208215EA60}"/>
-              </a:ext>
-            </a:extLst>
-          </p:cNvPr>
-          <p:cNvSpPr/>
-          <p:nvPr/>
-        </p:nvSpPr>
-        <p:spPr>
-          <a:xfrm>
-            <a:off x="8777038" y="2842550"/>
             <a:ext cx="862265" cy="647700"/>
           </a:xfrm>
           <a:prstGeom prst="rect">
@@ -17043,41 +16805,6 @@
           </a:p>
         </p:txBody>
       </p:sp>
-      <p:sp>
-        <p:nvSpPr>
-          <p:cNvPr id="29" name="TextBox 28">
-            <a:extLst>
-              <a:ext uri="{FF2B5EF4-FFF2-40B4-BE49-F238E27FC236}">
-                <a16:creationId xmlns:a16="http://schemas.microsoft.com/office/drawing/2014/main" id="{0127F2FA-227E-4BE7-A2ED-F9B187AED343}"/>
-              </a:ext>
-            </a:extLst>
-          </p:cNvPr>
-          <p:cNvSpPr txBox="1"/>
-          <p:nvPr/>
-        </p:nvSpPr>
-        <p:spPr>
-          <a:xfrm>
-            <a:off x="8777035" y="2983148"/>
-            <a:ext cx="862265" cy="369332"/>
-          </a:xfrm>
-          <a:prstGeom prst="rect">
-            <a:avLst/>
-          </a:prstGeom>
-          <a:noFill/>
-        </p:spPr>
-        <p:txBody>
-          <a:bodyPr wrap="square" rtlCol="0">
-            <a:spAutoFit/>
-          </a:bodyPr>
-          <a:lstStyle/>
-          <a:p>
-            <a:r>
-              <a:rPr lang="en-US" dirty="0"/>
-              <a:t>Button</a:t>
-            </a:r>
-          </a:p>
-        </p:txBody>
-      </p:sp>
       <p:cxnSp>
         <p:nvCxnSpPr>
           <p:cNvPr id="33" name="Straight Connector 32">
@@ -17117,43 +16844,6 @@
           </a:fontRef>
         </p:style>
       </p:cxnSp>
-      <p:cxnSp>
-        <p:nvCxnSpPr>
-          <p:cNvPr id="35" name="Straight Connector 34">
-            <a:extLst>
-              <a:ext uri="{FF2B5EF4-FFF2-40B4-BE49-F238E27FC236}">
-                <a16:creationId xmlns:a16="http://schemas.microsoft.com/office/drawing/2014/main" id="{6889DBAE-C462-475F-85F6-2FFB8E8C7044}"/>
-              </a:ext>
-            </a:extLst>
-          </p:cNvPr>
-          <p:cNvCxnSpPr/>
-          <p:nvPr/>
-        </p:nvCxnSpPr>
-        <p:spPr>
-          <a:xfrm flipH="1" flipV="1">
-            <a:off x="7852212" y="3168253"/>
-            <a:ext cx="908780" cy="4279"/>
-          </a:xfrm>
-          <a:prstGeom prst="line">
-            <a:avLst/>
-          </a:prstGeom>
-          <a:ln w="28575"/>
-        </p:spPr>
-        <p:style>
-          <a:lnRef idx="1">
-            <a:schemeClr val="dk1"/>
-          </a:lnRef>
-          <a:fillRef idx="0">
-            <a:schemeClr val="dk1"/>
-          </a:fillRef>
-          <a:effectRef idx="0">
-            <a:schemeClr val="dk1"/>
-          </a:effectRef>
-          <a:fontRef idx="minor">
-            <a:schemeClr val="tx1"/>
-          </a:fontRef>
-        </p:style>
-      </p:cxnSp>
       <p:sp>
         <p:nvSpPr>
           <p:cNvPr id="8" name="TextBox 7">
@@ -17169,41 +16859,6 @@
         <p:spPr>
           <a:xfrm>
             <a:off x="7066396" y="2219997"/>
-            <a:ext cx="775787" cy="369332"/>
-          </a:xfrm>
-          <a:prstGeom prst="rect">
-            <a:avLst/>
-          </a:prstGeom>
-          <a:noFill/>
-        </p:spPr>
-        <p:txBody>
-          <a:bodyPr wrap="square" rtlCol="0">
-            <a:spAutoFit/>
-          </a:bodyPr>
-          <a:lstStyle/>
-          <a:p>
-            <a:r>
-              <a:rPr lang="en-US" dirty="0"/>
-              <a:t>GPIO</a:t>
-            </a:r>
-          </a:p>
-        </p:txBody>
-      </p:sp>
-      <p:sp>
-        <p:nvSpPr>
-          <p:cNvPr id="36" name="TextBox 35">
-            <a:extLst>
-              <a:ext uri="{FF2B5EF4-FFF2-40B4-BE49-F238E27FC236}">
-                <a16:creationId xmlns:a16="http://schemas.microsoft.com/office/drawing/2014/main" id="{F160FDE5-DC1F-48C6-8423-8AE105D5F839}"/>
-              </a:ext>
-            </a:extLst>
-          </p:cNvPr>
-          <p:cNvSpPr txBox="1"/>
-          <p:nvPr/>
-        </p:nvSpPr>
-        <p:spPr>
-          <a:xfrm>
-            <a:off x="7075795" y="2971774"/>
             <a:ext cx="775787" cy="369332"/>
           </a:xfrm>
           <a:prstGeom prst="rect">
@@ -17863,8 +17518,8 @@
           </p:nvSpPr>
           <p:spPr>
             <a:xfrm>
-              <a:off x="6404309" y="4807970"/>
-              <a:ext cx="1458077" cy="369332"/>
+              <a:off x="6632909" y="4802797"/>
+              <a:ext cx="1229477" cy="369332"/>
             </a:xfrm>
             <a:prstGeom prst="rect">
               <a:avLst/>
@@ -17879,7 +17534,7 @@
             <a:p>
               <a:r>
                 <a:rPr lang="en-US" dirty="0"/>
-                <a:t>3.3V P1_14</a:t>
+                <a:t>3.3V SYS</a:t>
               </a:r>
             </a:p>
           </p:txBody>
@@ -17903,8 +17558,8 @@
         </p:nvCxnSpPr>
         <p:spPr>
           <a:xfrm>
-            <a:off x="7820777" y="4388882"/>
-            <a:ext cx="956258" cy="5927"/>
+            <a:off x="7820777" y="4383709"/>
+            <a:ext cx="956258" cy="11100"/>
           </a:xfrm>
           <a:prstGeom prst="line">
             <a:avLst/>
@@ -17926,193 +17581,6 @@
           </a:fontRef>
         </p:style>
       </p:cxnSp>
-      <p:grpSp>
-        <p:nvGrpSpPr>
-          <p:cNvPr id="29" name="Group 28">
-            <a:extLst>
-              <a:ext uri="{FF2B5EF4-FFF2-40B4-BE49-F238E27FC236}">
-                <a16:creationId xmlns:a16="http://schemas.microsoft.com/office/drawing/2014/main" id="{EA35686D-2CE3-4A76-B2BC-4C3B0B9DF9E3}"/>
-              </a:ext>
-            </a:extLst>
-          </p:cNvPr>
-          <p:cNvGrpSpPr/>
-          <p:nvPr/>
-        </p:nvGrpSpPr>
-        <p:grpSpPr>
-          <a:xfrm>
-            <a:off x="2550693" y="3645932"/>
-            <a:ext cx="1752600" cy="1562100"/>
-            <a:chOff x="6536157" y="2578768"/>
-            <a:chExt cx="1752600" cy="1562100"/>
-          </a:xfrm>
-          <a:solidFill>
-            <a:schemeClr val="bg1">
-              <a:lumMod val="65000"/>
-            </a:schemeClr>
-          </a:solidFill>
-        </p:grpSpPr>
-        <p:sp>
-          <p:nvSpPr>
-            <p:cNvPr id="30" name="Rectangle 29">
-              <a:extLst>
-                <a:ext uri="{FF2B5EF4-FFF2-40B4-BE49-F238E27FC236}">
-                  <a16:creationId xmlns:a16="http://schemas.microsoft.com/office/drawing/2014/main" id="{6BAC89B0-B1A6-4A15-B820-56624076FFBF}"/>
-                </a:ext>
-              </a:extLst>
-            </p:cNvPr>
-            <p:cNvSpPr/>
-            <p:nvPr/>
-          </p:nvSpPr>
-          <p:spPr>
-            <a:xfrm>
-              <a:off x="6536157" y="2578768"/>
-              <a:ext cx="1752600" cy="1562100"/>
-            </a:xfrm>
-            <a:prstGeom prst="rect">
-              <a:avLst/>
-            </a:prstGeom>
-            <a:grpFill/>
-          </p:spPr>
-          <p:style>
-            <a:lnRef idx="2">
-              <a:schemeClr val="accent1">
-                <a:shade val="50000"/>
-              </a:schemeClr>
-            </a:lnRef>
-            <a:fillRef idx="1">
-              <a:schemeClr val="accent1"/>
-            </a:fillRef>
-            <a:effectRef idx="0">
-              <a:schemeClr val="accent1"/>
-            </a:effectRef>
-            <a:fontRef idx="minor">
-              <a:schemeClr val="lt1"/>
-            </a:fontRef>
-          </p:style>
-          <p:txBody>
-            <a:bodyPr rtlCol="0" anchor="ctr"/>
-            <a:lstStyle/>
-            <a:p>
-              <a:pPr algn="ctr"/>
-              <a:endParaRPr lang="en-US"/>
-            </a:p>
-          </p:txBody>
-        </p:sp>
-        <p:sp>
-          <p:nvSpPr>
-            <p:cNvPr id="31" name="TextBox 30">
-              <a:extLst>
-                <a:ext uri="{FF2B5EF4-FFF2-40B4-BE49-F238E27FC236}">
-                  <a16:creationId xmlns:a16="http://schemas.microsoft.com/office/drawing/2014/main" id="{76B12C04-B109-4854-9633-32052677059A}"/>
-                </a:ext>
-              </a:extLst>
-            </p:cNvPr>
-            <p:cNvSpPr txBox="1"/>
-            <p:nvPr/>
-          </p:nvSpPr>
-          <p:spPr>
-            <a:xfrm>
-              <a:off x="6840957" y="2967981"/>
-              <a:ext cx="1143000" cy="646331"/>
-            </a:xfrm>
-            <a:prstGeom prst="rect">
-              <a:avLst/>
-            </a:prstGeom>
-            <a:grpFill/>
-          </p:spPr>
-          <p:txBody>
-            <a:bodyPr wrap="square" rtlCol="0">
-              <a:spAutoFit/>
-            </a:bodyPr>
-            <a:lstStyle/>
-            <a:p>
-              <a:pPr algn="ctr"/>
-              <a:r>
-                <a:rPr lang="en-US" dirty="0"/>
-                <a:t>Power Bank</a:t>
-              </a:r>
-            </a:p>
-          </p:txBody>
-        </p:sp>
-      </p:grpSp>
-      <p:cxnSp>
-        <p:nvCxnSpPr>
-          <p:cNvPr id="32" name="Straight Connector 31">
-            <a:extLst>
-              <a:ext uri="{FF2B5EF4-FFF2-40B4-BE49-F238E27FC236}">
-                <a16:creationId xmlns:a16="http://schemas.microsoft.com/office/drawing/2014/main" id="{D0E9310E-713C-44C3-AB85-B142B2C7D390}"/>
-              </a:ext>
-            </a:extLst>
-          </p:cNvPr>
-          <p:cNvCxnSpPr>
-            <a:stCxn id="30" idx="3"/>
-          </p:cNvCxnSpPr>
-          <p:nvPr/>
-        </p:nvCxnSpPr>
-        <p:spPr>
-          <a:xfrm>
-            <a:off x="4303293" y="4426982"/>
-            <a:ext cx="935457" cy="0"/>
-          </a:xfrm>
-          <a:prstGeom prst="line">
-            <a:avLst/>
-          </a:prstGeom>
-          <a:ln w="28575">
-            <a:solidFill>
-              <a:srgbClr val="FF0000"/>
-            </a:solidFill>
-          </a:ln>
-        </p:spPr>
-        <p:style>
-          <a:lnRef idx="1">
-            <a:schemeClr val="dk1"/>
-          </a:lnRef>
-          <a:fillRef idx="0">
-            <a:schemeClr val="dk1"/>
-          </a:fillRef>
-          <a:effectRef idx="0">
-            <a:schemeClr val="dk1"/>
-          </a:effectRef>
-          <a:fontRef idx="minor">
-            <a:schemeClr val="tx1"/>
-          </a:fontRef>
-        </p:style>
-      </p:cxnSp>
-      <p:sp>
-        <p:nvSpPr>
-          <p:cNvPr id="33" name="TextBox 32">
-            <a:extLst>
-              <a:ext uri="{FF2B5EF4-FFF2-40B4-BE49-F238E27FC236}">
-                <a16:creationId xmlns:a16="http://schemas.microsoft.com/office/drawing/2014/main" id="{20EFD251-8E30-4B2D-9756-2351AA09860B}"/>
-              </a:ext>
-            </a:extLst>
-          </p:cNvPr>
-          <p:cNvSpPr txBox="1"/>
-          <p:nvPr/>
-        </p:nvSpPr>
-        <p:spPr>
-          <a:xfrm>
-            <a:off x="4457700" y="4073673"/>
-            <a:ext cx="715877" cy="369332"/>
-          </a:xfrm>
-          <a:prstGeom prst="rect">
-            <a:avLst/>
-          </a:prstGeom>
-          <a:noFill/>
-        </p:spPr>
-        <p:txBody>
-          <a:bodyPr wrap="square" rtlCol="0">
-            <a:spAutoFit/>
-          </a:bodyPr>
-          <a:lstStyle/>
-          <a:p>
-            <a:r>
-              <a:rPr lang="en-US" dirty="0"/>
-              <a:t>4.8A</a:t>
-            </a:r>
-          </a:p>
-        </p:txBody>
-      </p:sp>
       <p:sp>
         <p:nvSpPr>
           <p:cNvPr id="36" name="TextBox 35">
@@ -18238,57 +17706,6 @@
       </p:sp>
       <p:sp>
         <p:nvSpPr>
-          <p:cNvPr id="34" name="Rectangle 33">
-            <a:extLst>
-              <a:ext uri="{FF2B5EF4-FFF2-40B4-BE49-F238E27FC236}">
-                <a16:creationId xmlns:a16="http://schemas.microsoft.com/office/drawing/2014/main" id="{42B4A8D7-D87D-4CDC-8353-AA4D762C431D}"/>
-              </a:ext>
-            </a:extLst>
-          </p:cNvPr>
-          <p:cNvSpPr/>
-          <p:nvPr/>
-        </p:nvSpPr>
-        <p:spPr>
-          <a:xfrm>
-            <a:off x="8764400" y="2659893"/>
-            <a:ext cx="862265" cy="647700"/>
-          </a:xfrm>
-          <a:prstGeom prst="rect">
-            <a:avLst/>
-          </a:prstGeom>
-          <a:solidFill>
-            <a:schemeClr val="bg1">
-              <a:lumMod val="65000"/>
-            </a:schemeClr>
-          </a:solidFill>
-        </p:spPr>
-        <p:style>
-          <a:lnRef idx="2">
-            <a:schemeClr val="accent1">
-              <a:shade val="50000"/>
-            </a:schemeClr>
-          </a:lnRef>
-          <a:fillRef idx="1">
-            <a:schemeClr val="accent1"/>
-          </a:fillRef>
-          <a:effectRef idx="0">
-            <a:schemeClr val="accent1"/>
-          </a:effectRef>
-          <a:fontRef idx="minor">
-            <a:schemeClr val="lt1"/>
-          </a:fontRef>
-        </p:style>
-        <p:txBody>
-          <a:bodyPr rtlCol="0" anchor="ctr"/>
-          <a:lstStyle/>
-          <a:p>
-            <a:pPr algn="ctr"/>
-            <a:endParaRPr lang="en-US"/>
-          </a:p>
-        </p:txBody>
-      </p:sp>
-      <p:sp>
-        <p:nvSpPr>
           <p:cNvPr id="4" name="TextBox 3">
             <a:extLst>
               <a:ext uri="{FF2B5EF4-FFF2-40B4-BE49-F238E27FC236}">
@@ -18302,41 +17719,6 @@
         <p:spPr>
           <a:xfrm>
             <a:off x="8764398" y="2003263"/>
-            <a:ext cx="862265" cy="369332"/>
-          </a:xfrm>
-          <a:prstGeom prst="rect">
-            <a:avLst/>
-          </a:prstGeom>
-          <a:noFill/>
-        </p:spPr>
-        <p:txBody>
-          <a:bodyPr wrap="square" rtlCol="0">
-            <a:spAutoFit/>
-          </a:bodyPr>
-          <a:lstStyle/>
-          <a:p>
-            <a:r>
-              <a:rPr lang="en-US" dirty="0"/>
-              <a:t>Button</a:t>
-            </a:r>
-          </a:p>
-        </p:txBody>
-      </p:sp>
-      <p:sp>
-        <p:nvSpPr>
-          <p:cNvPr id="35" name="TextBox 34">
-            <a:extLst>
-              <a:ext uri="{FF2B5EF4-FFF2-40B4-BE49-F238E27FC236}">
-                <a16:creationId xmlns:a16="http://schemas.microsoft.com/office/drawing/2014/main" id="{CC61D7C5-7B2C-44CE-BEF3-C0FABC60FBD5}"/>
-              </a:ext>
-            </a:extLst>
-          </p:cNvPr>
-          <p:cNvSpPr txBox="1"/>
-          <p:nvPr/>
-        </p:nvSpPr>
-        <p:spPr>
-          <a:xfrm>
-            <a:off x="8764397" y="2800491"/>
             <a:ext cx="862265" cy="369332"/>
           </a:xfrm>
           <a:prstGeom prst="rect">
@@ -18396,43 +17778,6 @@
           </a:fontRef>
         </p:style>
       </p:cxnSp>
-      <p:cxnSp>
-        <p:nvCxnSpPr>
-          <p:cNvPr id="38" name="Straight Connector 37">
-            <a:extLst>
-              <a:ext uri="{FF2B5EF4-FFF2-40B4-BE49-F238E27FC236}">
-                <a16:creationId xmlns:a16="http://schemas.microsoft.com/office/drawing/2014/main" id="{C12295E5-46B1-4018-8480-A5482D6CAF2E}"/>
-              </a:ext>
-            </a:extLst>
-          </p:cNvPr>
-          <p:cNvCxnSpPr/>
-          <p:nvPr/>
-        </p:nvCxnSpPr>
-        <p:spPr>
-          <a:xfrm flipH="1" flipV="1">
-            <a:off x="7839574" y="2985596"/>
-            <a:ext cx="908780" cy="4279"/>
-          </a:xfrm>
-          <a:prstGeom prst="line">
-            <a:avLst/>
-          </a:prstGeom>
-          <a:ln w="28575"/>
-        </p:spPr>
-        <p:style>
-          <a:lnRef idx="1">
-            <a:schemeClr val="dk1"/>
-          </a:lnRef>
-          <a:fillRef idx="0">
-            <a:schemeClr val="dk1"/>
-          </a:fillRef>
-          <a:effectRef idx="0">
-            <a:schemeClr val="dk1"/>
-          </a:effectRef>
-          <a:fontRef idx="minor">
-            <a:schemeClr val="tx1"/>
-          </a:fontRef>
-        </p:style>
-      </p:cxnSp>
       <p:sp>
         <p:nvSpPr>
           <p:cNvPr id="7" name="TextBox 6">
@@ -18461,77 +17806,6 @@
           </a:bodyPr>
           <a:lstStyle/>
           <a:p>
-            <a:r>
-              <a:rPr lang="en-US" dirty="0"/>
-              <a:t>GPIO 59</a:t>
-            </a:r>
-          </a:p>
-        </p:txBody>
-      </p:sp>
-      <p:sp>
-        <p:nvSpPr>
-          <p:cNvPr id="39" name="TextBox 38">
-            <a:extLst>
-              <a:ext uri="{FF2B5EF4-FFF2-40B4-BE49-F238E27FC236}">
-                <a16:creationId xmlns:a16="http://schemas.microsoft.com/office/drawing/2014/main" id="{D53C6E17-6C74-4641-A814-26D13DC44BFF}"/>
-              </a:ext>
-            </a:extLst>
-          </p:cNvPr>
-          <p:cNvSpPr txBox="1"/>
-          <p:nvPr/>
-        </p:nvSpPr>
-        <p:spPr>
-          <a:xfrm>
-            <a:off x="6735926" y="2788264"/>
-            <a:ext cx="1077078" cy="369332"/>
-          </a:xfrm>
-          <a:prstGeom prst="rect">
-            <a:avLst/>
-          </a:prstGeom>
-          <a:noFill/>
-        </p:spPr>
-        <p:txBody>
-          <a:bodyPr wrap="square" rtlCol="0">
-            <a:spAutoFit/>
-          </a:bodyPr>
-          <a:lstStyle/>
-          <a:p>
-            <a:r>
-              <a:rPr lang="en-US" dirty="0"/>
-              <a:t>GPIO 58</a:t>
-            </a:r>
-          </a:p>
-        </p:txBody>
-      </p:sp>
-      <p:sp>
-        <p:nvSpPr>
-          <p:cNvPr id="40" name="TextBox 39">
-            <a:extLst>
-              <a:ext uri="{FF2B5EF4-FFF2-40B4-BE49-F238E27FC236}">
-                <a16:creationId xmlns:a16="http://schemas.microsoft.com/office/drawing/2014/main" id="{DA99F51F-E981-491B-AD73-C8FBF0F9F189}"/>
-              </a:ext>
-            </a:extLst>
-          </p:cNvPr>
-          <p:cNvSpPr txBox="1"/>
-          <p:nvPr/>
-        </p:nvSpPr>
-        <p:spPr>
-          <a:xfrm>
-            <a:off x="7952069" y="2662440"/>
-            <a:ext cx="715877" cy="369332"/>
-          </a:xfrm>
-          <a:prstGeom prst="rect">
-            <a:avLst/>
-          </a:prstGeom>
-          <a:noFill/>
-        </p:spPr>
-        <p:txBody>
-          <a:bodyPr wrap="square" rtlCol="0">
-            <a:spAutoFit/>
-          </a:bodyPr>
-          <a:lstStyle/>
-          <a:p>
-            <a:pPr algn="ctr"/>
             <a:r>
               <a:rPr lang="en-US" dirty="0"/>
               <a:t>3.3V</a:t>

</xml_diff>